<commit_message>
powerpoint for the project presentation
</commit_message>
<xml_diff>
--- a/Deep Learning (1).pptx
+++ b/Deep Learning (1).pptx
@@ -5949,7 +5949,7 @@
           <a:p>
             <a:r>
               <a:rPr lang="en-US" dirty="0"/>
-              <a:t>When the training is done, the program gives a graph that shows the predicted stocks compared to the true stocks along with the accuracy of the prediction.</a:t>
+              <a:t>When the training is done, the program gives a graph that shows the predicted stocks compared to the true stocks along with the accuracy of the prediction. The Percentage number above the graph shows that the prediction was 49.57% accurate.</a:t>
             </a:r>
           </a:p>
         </p:txBody>
@@ -5976,7 +5976,7 @@
         </p:blipFill>
         <p:spPr>
           <a:xfrm>
-            <a:off x="677334" y="3080574"/>
+            <a:off x="912226" y="3357411"/>
             <a:ext cx="4804128" cy="3190977"/>
           </a:xfrm>
           <a:prstGeom prst="rect">
@@ -6117,6 +6117,22 @@
               <a:rPr lang="en-US" dirty="0"/>
               <a:t> </a:t>
             </a:r>
+          </a:p>
+          <a:p>
+            <a:r>
+              <a:rPr lang="en-US" dirty="0"/>
+              <a:t>RNN model retrieved from: </a:t>
+            </a:r>
+            <a:r>
+              <a:rPr lang="en-US" dirty="0">
+                <a:hlinkClick r:id="rId5" tooltip="https://lilianweng.github.io/lil-log/2017/07/08/predict-stock-prices-using-RNN-part-1.html"/>
+              </a:rPr>
+              <a:t>https://lilianweng.github.io/lil-log/2017/07/08/predict-stock-prices-using-RNN-part-1.html</a:t>
+            </a:r>
+            <a:endParaRPr lang="en-US" dirty="0"/>
+          </a:p>
+          <a:p>
+            <a:endParaRPr lang="en-US" dirty="0"/>
           </a:p>
         </p:txBody>
       </p:sp>
@@ -6747,14 +6763,42 @@
             <p:ph idx="1"/>
           </p:nvPr>
         </p:nvSpPr>
-        <p:spPr/>
+        <p:spPr>
+          <a:ln>
+            <a:noFill/>
+          </a:ln>
+        </p:spPr>
         <p:txBody>
           <a:bodyPr/>
           <a:lstStyle/>
           <a:p>
             <a:r>
               <a:rPr lang="en-US" dirty="0"/>
-              <a:t>The RNN project uses a recurrent neural network to train a program to predict google and amazon stocks. A graph based on the programs prediction is made and is compared to the true stock graph. However, since the stock market can be unpredictable, the accuracy of the predictions are sometimes inconsistent  </a:t>
+              <a:t>The RNN project uses a recurrent neural network to train a program to predict google and amazon stocks. A graph based on the programs prediction is made and is compared to the true stock graph. However, since the stock market can be unpredictable, the accuracy of the predictions are sometimes inconsistent. There are 2 versions of the RNN: RNN Notebook.ipynb2, which uses </a:t>
+            </a:r>
+            <a:r>
+              <a:rPr lang="en-US" dirty="0" err="1"/>
+              <a:t>tensorflow</a:t>
+            </a:r>
+            <a:r>
+              <a:rPr lang="en-US" dirty="0"/>
+              <a:t>; and </a:t>
+            </a:r>
+            <a:r>
+              <a:rPr lang="en-US" dirty="0" err="1"/>
+              <a:t>RNN_Keras.ipynb</a:t>
+            </a:r>
+            <a:r>
+              <a:rPr lang="en-US" dirty="0"/>
+              <a:t>, which uses </a:t>
+            </a:r>
+            <a:r>
+              <a:rPr lang="en-US" dirty="0" err="1"/>
+              <a:t>keras</a:t>
+            </a:r>
+            <a:r>
+              <a:rPr lang="en-US" dirty="0"/>
+              <a:t>.</a:t>
             </a:r>
           </a:p>
         </p:txBody>
@@ -6836,28 +6880,62 @@
         <p:spPr/>
         <p:txBody>
           <a:bodyPr>
-            <a:normAutofit fontScale="77500" lnSpcReduction="20000"/>
+            <a:normAutofit fontScale="85000" lnSpcReduction="10000"/>
           </a:bodyPr>
           <a:lstStyle/>
           <a:p>
             <a:r>
               <a:rPr lang="en-US" dirty="0"/>
-              <a:t>The program is trained on 3947 data points from google and amazon stock prices.</a:t>
-            </a:r>
-          </a:p>
-          <a:p>
-            <a:endParaRPr lang="en-US" dirty="0"/>
-          </a:p>
-          <a:p>
-            <a:r>
-              <a:rPr lang="en-US" dirty="0"/>
-              <a:t>The dataset that has been pre generated and is not the most recent. To get the most recent datasets for the RNN program, you will need to get an API key.</a:t>
-            </a:r>
-          </a:p>
-          <a:p>
-            <a:r>
-              <a:rPr lang="en-US" dirty="0"/>
-              <a:t>Instructions for getting an API key</a:t>
+              <a:t>The program is trained on 3947 data points from google and amazon stock prices. There are 4 different data files used for the RNN; </a:t>
+            </a:r>
+            <a:r>
+              <a:rPr lang="en-US" dirty="0">
+                <a:hlinkClick r:id="rId2" tooltip="amzn.txt"/>
+              </a:rPr>
+              <a:t>amzn.txt</a:t>
+            </a:r>
+            <a:r>
+              <a:rPr lang="en-US" dirty="0"/>
+              <a:t>, </a:t>
+            </a:r>
+            <a:r>
+              <a:rPr lang="en-US" dirty="0">
+                <a:hlinkClick r:id="rId3" tooltip="daily_amzn.csv"/>
+              </a:rPr>
+              <a:t>daily_amzn.csv</a:t>
+            </a:r>
+            <a:r>
+              <a:rPr lang="en-US" dirty="0"/>
+              <a:t>, </a:t>
+            </a:r>
+            <a:r>
+              <a:rPr lang="en-US" dirty="0">
+                <a:hlinkClick r:id="rId4" tooltip="daily_goog.csv"/>
+              </a:rPr>
+              <a:t>daily_goog.csv</a:t>
+            </a:r>
+            <a:r>
+              <a:rPr lang="en-US" dirty="0"/>
+              <a:t>, and </a:t>
+            </a:r>
+            <a:r>
+              <a:rPr lang="en-US" dirty="0">
+                <a:hlinkClick r:id="rId5" tooltip="goog.txt"/>
+              </a:rPr>
+              <a:t>goog.txt</a:t>
+            </a:r>
+            <a:r>
+              <a:rPr lang="en-US" dirty="0"/>
+              <a:t>. The .csv files are data generated by an API and the .txt files are derived from the data needed from the .csv files and put into a format that the program can read. Amzn.txt is data from Amazon stocks and goog.txt is data from Google stocks.</a:t>
+            </a:r>
+          </a:p>
+          <a:p>
+            <a:endParaRPr lang="en-US" dirty="0"/>
+          </a:p>
+          <a:p>
+            <a:r>
+              <a:rPr lang="en-US" dirty="0"/>
+              <a:t>To get the most recent datasets for the RNN program, you will need to get an API key.</a:t>
             </a:r>
           </a:p>
           <a:p>
@@ -6898,10 +6976,7 @@
             </a:r>
           </a:p>
           <a:p>
-            <a:endParaRPr lang="en-US" dirty="0"/>
-          </a:p>
-          <a:p>
-            <a:pPr lvl="1"/>
+            <a:pPr lvl="2"/>
             <a:r>
               <a:rPr lang="en-US" dirty="0"/>
               <a:t>curl -o daily_amzn.csv "https://www.alphavantage.co/query? function=</a:t>
@@ -6932,10 +7007,7 @@
             </a:r>
           </a:p>
           <a:p>
-            <a:endParaRPr lang="en-US" dirty="0"/>
-          </a:p>
-          <a:p>
-            <a:pPr lvl="1"/>
+            <a:pPr lvl="2"/>
             <a:r>
               <a:rPr lang="en-US" dirty="0"/>
               <a:t>curl -o daily_goog.csv "https://www.alphavantage.co/query? function=</a:t>
@@ -7025,28 +7097,73 @@
           </a:p>
         </p:txBody>
       </p:sp>
-      <p:sp>
-        <p:nvSpPr>
-          <p:cNvPr id="3" name="Content Placeholder 2">
+      <p:pic>
+        <p:nvPicPr>
+          <p:cNvPr id="5" name="Content Placeholder 4">
             <a:extLst>
               <a:ext uri="{FF2B5EF4-FFF2-40B4-BE49-F238E27FC236}">
-                <a16:creationId xmlns:a16="http://schemas.microsoft.com/office/drawing/2014/main" id="{8485CE01-BA18-4FE0-9A31-7D1E1C024177}"/>
+                <a16:creationId xmlns:a16="http://schemas.microsoft.com/office/drawing/2014/main" id="{AC551A94-A04B-41E1-9235-EF08BA1E1569}"/>
               </a:ext>
             </a:extLst>
           </p:cNvPr>
-          <p:cNvSpPr>
-            <a:spLocks noGrp="1"/>
-          </p:cNvSpPr>
+          <p:cNvPicPr>
+            <a:picLocks noGrp="1" noChangeAspect="1"/>
+          </p:cNvPicPr>
           <p:nvPr>
             <p:ph idx="1"/>
           </p:nvPr>
-        </p:nvSpPr>
-        <p:spPr/>
-        <p:txBody>
-          <a:bodyPr/>
-          <a:lstStyle/>
-          <a:p>
-            <a:endParaRPr lang="en-US"/>
+        </p:nvPicPr>
+        <p:blipFill>
+          <a:blip r:embed="rId2"/>
+          <a:stretch>
+            <a:fillRect/>
+          </a:stretch>
+        </p:blipFill>
+        <p:spPr>
+          <a:xfrm>
+            <a:off x="1704181" y="2572544"/>
+            <a:ext cx="6543675" cy="3057525"/>
+          </a:xfrm>
+        </p:spPr>
+      </p:pic>
+      <p:sp>
+        <p:nvSpPr>
+          <p:cNvPr id="6" name="TextBox 5">
+            <a:extLst>
+              <a:ext uri="{FF2B5EF4-FFF2-40B4-BE49-F238E27FC236}">
+                <a16:creationId xmlns:a16="http://schemas.microsoft.com/office/drawing/2014/main" id="{D3B3081D-16E7-41B3-925C-90A6E3D91D46}"/>
+              </a:ext>
+            </a:extLst>
+          </p:cNvPr>
+          <p:cNvSpPr txBox="1"/>
+          <p:nvPr/>
+        </p:nvSpPr>
+        <p:spPr>
+          <a:xfrm>
+            <a:off x="1704181" y="5878286"/>
+            <a:ext cx="9058894" cy="261610"/>
+          </a:xfrm>
+          <a:prstGeom prst="rect">
+            <a:avLst/>
+          </a:prstGeom>
+          <a:noFill/>
+        </p:spPr>
+        <p:txBody>
+          <a:bodyPr wrap="square" rtlCol="0">
+            <a:spAutoFit/>
+          </a:bodyPr>
+          <a:lstStyle/>
+          <a:p>
+            <a:r>
+              <a:rPr lang="en-US" sz="1100" dirty="0">
+                <a:hlinkClick r:id="rId3"/>
+              </a:rPr>
+              <a:t>https://lilianweng.github.io/lil-log/assets/images/unrolled_RNN.png</a:t>
+            </a:r>
+            <a:r>
+              <a:rPr lang="en-US" sz="1100" dirty="0"/>
+              <a:t> </a:t>
+            </a:r>
           </a:p>
         </p:txBody>
       </p:sp>

</xml_diff>